<commit_message>
Enhance PPTX translation by preserving text formatting and structure
</commit_message>
<xml_diff>
--- a/TestPPT_1_2_zh.pptx
+++ b/TestPPT_1_2_zh.pptx
@@ -6779,23 +6779,75 @@
           </a:bodyPr>
           <a:lstStyle/>
           <a:p>
+            <a:pPr marL="0" marR="0" indent="0" algn="ctr" rtl="0">
+              <a:lnSpc>
+                <a:spcPct val="90000"/>
+              </a:lnSpc>
+              <a:spcBef>
+                <a:spcPts val="0"/>
+              </a:spcBef>
+              <a:spcAft>
+                <a:spcPts val="0"/>
+              </a:spcAft>
+              <a:buNone/>
+            </a:pPr>
             <a:r>
-              <a:t>制作</a:t>
+              <a:rPr sz="8499">
+                <a:solidFill>
+                  <a:srgbClr val="F9F3E5"/>
+                </a:solidFill>
+                <a:latin typeface="Calistoga"/>
+              </a:rPr>
+              <a:t>做</a:t>
+            </a:r>
+            <a:endParaRPr/>
+          </a:p>
+          <a:p>
+            <a:pPr algn="ctr">
+              <a:lnSpc>
+                <a:spcPct val="90000"/>
+              </a:lnSpc>
+            </a:pPr>
+            <a:r>
+              <a:rPr sz="8499">
+                <a:solidFill>
+                  <a:srgbClr val="F9F3E5"/>
+                </a:solidFill>
+                <a:latin typeface="Calistoga"/>
+              </a:rPr>
+              <a:t>物联网接入</a:t>
             </a:r>
           </a:p>
           <a:p>
+            <a:pPr algn="ctr">
+              <a:lnSpc>
+                <a:spcPct val="90000"/>
+              </a:lnSpc>
+            </a:pPr>
             <a:r>
-              <a:t>连接在</a:t>
-            </a:r>
-          </a:p>
-          <a:p>
-            <a:r>
+              <a:rPr sz="8499">
+                <a:solidFill>
+                  <a:srgbClr val="F9F3E5"/>
+                </a:solidFill>
+                <a:latin typeface="Calistoga"/>
+              </a:rPr>
               <a:t>信息</a:t>
             </a:r>
           </a:p>
           <a:p>
+            <a:pPr algn="ctr">
+              <a:lnSpc>
+                <a:spcPct val="90000"/>
+              </a:lnSpc>
+            </a:pPr>
             <a:r>
-              <a:t>文本</a:t>
+              <a:rPr sz="8499">
+                <a:solidFill>
+                  <a:srgbClr val="F9F3E5"/>
+                </a:solidFill>
+                <a:latin typeface="Calistoga"/>
+              </a:rPr>
+              <a:t>文案</a:t>
             </a:r>
           </a:p>
         </p:txBody>
@@ -7057,13 +7109,43 @@
           </a:bodyPr>
           <a:lstStyle/>
           <a:p>
+            <a:pPr marL="0" marR="0" indent="0" algn="ctr" rtl="0">
+              <a:lnSpc>
+                <a:spcPct val="110005"/>
+              </a:lnSpc>
+              <a:spcBef>
+                <a:spcPts val="0"/>
+              </a:spcBef>
+              <a:spcAft>
+                <a:spcPts val="0"/>
+              </a:spcAft>
+              <a:buNone/>
+            </a:pPr>
             <a:r>
+              <a:rPr sz="1999" b="1">
+                <a:solidFill>
+                  <a:srgbClr val="000000"/>
+                </a:solidFill>
+                <a:latin typeface="DM Sans"/>
+              </a:rPr>
               <a:t>通过语言组织</a:t>
             </a:r>
+            <a:endParaRPr/>
           </a:p>
           <a:p>
+            <a:pPr algn="ctr">
+              <a:lnSpc>
+                <a:spcPct val="110005"/>
+              </a:lnSpc>
+            </a:pPr>
             <a:r>
-              <a:t>和信息链接</a:t>
+              <a:rPr sz="1999" b="1">
+                <a:solidFill>
+                  <a:srgbClr val="000000"/>
+                </a:solidFill>
+                <a:latin typeface="DM Sans"/>
+              </a:rPr>
+              <a:t>信息链接</a:t>
             </a:r>
           </a:p>
         </p:txBody>
@@ -7153,9 +7235,28 @@
           </a:bodyPr>
           <a:lstStyle/>
           <a:p>
+            <a:pPr marL="0" marR="0" indent="0" algn="r" rtl="0">
+              <a:lnSpc>
+                <a:spcPct val="90000"/>
+              </a:lnSpc>
+              <a:spcBef>
+                <a:spcPts val="0"/>
+              </a:spcBef>
+              <a:spcAft>
+                <a:spcPts val="0"/>
+              </a:spcAft>
+              <a:buNone/>
+            </a:pPr>
             <a:r>
+              <a:rPr sz="9999">
+                <a:solidFill>
+                  <a:srgbClr val="00896B"/>
+                </a:solidFill>
+                <a:latin typeface="Calistoga"/>
+              </a:rPr>
               <a:t>理解句子</a:t>
             </a:r>
+            <a:endParaRPr/>
           </a:p>
         </p:txBody>
       </p:sp>
@@ -7184,9 +7285,28 @@
           </a:bodyPr>
           <a:lstStyle/>
           <a:p>
+            <a:pPr marL="0" marR="0" indent="0" algn="just" rtl="0">
+              <a:lnSpc>
+                <a:spcPct val="115000"/>
+              </a:lnSpc>
+              <a:spcBef>
+                <a:spcPts val="0"/>
+              </a:spcBef>
+              <a:spcAft>
+                <a:spcPts val="0"/>
+              </a:spcAft>
+              <a:buNone/>
+            </a:pPr>
             <a:r>
+              <a:rPr sz="3499">
+                <a:solidFill>
+                  <a:srgbClr val="000000"/>
+                </a:solidFill>
+                <a:latin typeface="DM Sans"/>
+              </a:rPr>
               <a:t>了解作者如何组织语言并在段落或文章中链接信息，有助于我们确定所阅读内容的目的和关键思想。</a:t>
             </a:r>
+            <a:endParaRPr/>
           </a:p>
         </p:txBody>
       </p:sp>

</xml_diff>